<commit_message>
final checkin before presentation
updated folder location
</commit_message>
<xml_diff>
--- a/2016-06-01 - Practical SQL Server​.pptx
+++ b/2016-06-01 - Practical SQL Server​.pptx
@@ -701,7 +701,15 @@
           <a:p>
             <a:r>
               <a:rPr lang="en-CA" dirty="0" smtClean="0"/>
-              <a:t>C:\LocalDev\2016-06\GitMe\2016-June-AppPractice\Supporting Scripts\10 - Mapping profiler to extended </a:t>
+              <a:t>C:\</a:t>
+            </a:r>
+            <a:r>
+              <a:rPr lang="en-CA" dirty="0" smtClean="0"/>
+              <a:t>LocalDev\2016-06\GitMe\2016-June-SQL\Supporting </a:t>
+            </a:r>
+            <a:r>
+              <a:rPr lang="en-CA" dirty="0" smtClean="0"/>
+              <a:t>Scripts\10 - Mapping profiler to extended </a:t>
             </a:r>
             <a:r>
               <a:rPr lang="en-CA" dirty="0" err="1" smtClean="0"/>
@@ -812,7 +820,15 @@
           <a:p>
             <a:r>
               <a:rPr lang="en-CA" baseline="0" dirty="0" smtClean="0"/>
-              <a:t>C:\LocalDev\2016-06\GitMe\2016-June-AppPractice\Supporting Scripts\20 - Formatting </a:t>
+              <a:t>C:\</a:t>
+            </a:r>
+            <a:r>
+              <a:rPr lang="en-CA" baseline="0" dirty="0" smtClean="0"/>
+              <a:t>LocalDev\2016-06\GitMe\2016-June-SQL\Supporting </a:t>
+            </a:r>
+            <a:r>
+              <a:rPr lang="en-CA" baseline="0" dirty="0" smtClean="0"/>
+              <a:t>Scripts\20 - Formatting </a:t>
             </a:r>
             <a:r>
               <a:rPr lang="en-CA" baseline="0" dirty="0" err="1" smtClean="0"/>
@@ -916,7 +932,15 @@
           <a:p>
             <a:r>
               <a:rPr lang="en-CA" dirty="0" smtClean="0"/>
-              <a:t>C:\LocalDev\2016-06\GitMe\2016-June-AppPractice\Supporting Scripts\40 - Perf </a:t>
+              <a:t>C:\</a:t>
+            </a:r>
+            <a:r>
+              <a:rPr lang="en-CA" dirty="0" smtClean="0"/>
+              <a:t>LocalDev\2016-06\GitMe\2016-June-SQL\Supporting </a:t>
+            </a:r>
+            <a:r>
+              <a:rPr lang="en-CA" dirty="0" smtClean="0"/>
+              <a:t>Scripts\40 - Perf </a:t>
             </a:r>
             <a:r>
               <a:rPr lang="en-CA" dirty="0" err="1" smtClean="0"/>
@@ -1072,7 +1096,15 @@
           <a:p>
             <a:r>
               <a:rPr lang="en-CA" dirty="0" smtClean="0"/>
-              <a:t>C:\LocalDev\2016-06\GitMe\2016-June-AppPractice\Supporting Scripts\41 - some date </a:t>
+              <a:t>C:\</a:t>
+            </a:r>
+            <a:r>
+              <a:rPr lang="en-CA" dirty="0" smtClean="0"/>
+              <a:t>LocalDev\2016-06\GitMe\2016-June-SQL\Supporting </a:t>
+            </a:r>
+            <a:r>
+              <a:rPr lang="en-CA" dirty="0" smtClean="0"/>
+              <a:t>Scripts\41 - some date </a:t>
             </a:r>
             <a:r>
               <a:rPr lang="en-CA" dirty="0" err="1" smtClean="0"/>
@@ -1170,7 +1202,15 @@
           <a:p>
             <a:r>
               <a:rPr lang="en-CA" dirty="0" smtClean="0"/>
-              <a:t>C:\LocalDev\2016-06\GitMe\2016-June-AppPractice\Supporting Scripts\42 - Avoid Select </a:t>
+              <a:t>C:\</a:t>
+            </a:r>
+            <a:r>
+              <a:rPr lang="en-CA" dirty="0" smtClean="0"/>
+              <a:t>LocalDev\2016-06\GitMe\2016-June-SQL\Supporting </a:t>
+            </a:r>
+            <a:r>
+              <a:rPr lang="en-CA" dirty="0" smtClean="0"/>
+              <a:t>Scripts\42 - Avoid Select </a:t>
             </a:r>
             <a:r>
               <a:rPr lang="en-CA" dirty="0" err="1" smtClean="0"/>
@@ -1268,7 +1308,15 @@
           <a:p>
             <a:r>
               <a:rPr lang="en-CA" dirty="0" smtClean="0"/>
-              <a:t>C:\LocalDev\2016-06\GitMe\2016-June-AppPractice\Supporting Scripts\51 - EXISTS - SELECT piece does not </a:t>
+              <a:t>C:\</a:t>
+            </a:r>
+            <a:r>
+              <a:rPr lang="en-CA" dirty="0" smtClean="0"/>
+              <a:t>LocalDev\2016-06\GitMe\2016-June-SQL\Supporting </a:t>
+            </a:r>
+            <a:r>
+              <a:rPr lang="en-CA" dirty="0" smtClean="0"/>
+              <a:t>Scripts\51 - EXISTS - SELECT piece does not </a:t>
             </a:r>
             <a:r>
               <a:rPr lang="en-CA" dirty="0" err="1" smtClean="0"/>
@@ -1416,7 +1464,15 @@
           <a:p>
             <a:r>
               <a:rPr lang="en-CA" dirty="0" smtClean="0"/>
-              <a:t>C:\LocalDev\2016-06\GitMe\2016-June-AppPractice\Supporting Scripts\51 - Parameter </a:t>
+              <a:t>C:\</a:t>
+            </a:r>
+            <a:r>
+              <a:rPr lang="en-CA" dirty="0" smtClean="0"/>
+              <a:t>LocalDev\2016-06\GitMe\2016-June-SQL\Supporting </a:t>
+            </a:r>
+            <a:r>
+              <a:rPr lang="en-CA" dirty="0" smtClean="0"/>
+              <a:t>Scripts\51 - Parameter </a:t>
             </a:r>
             <a:r>
               <a:rPr lang="en-CA" dirty="0" err="1" smtClean="0"/>
@@ -1520,7 +1576,15 @@
           <a:p>
             <a:r>
               <a:rPr lang="en-CA" dirty="0" smtClean="0"/>
-              <a:t>C:\LocalDev\2016-06\GitMe\2016-June-AppPractice\Supporting Scripts\52 - SQL Functions are </a:t>
+              <a:t>C:\</a:t>
+            </a:r>
+            <a:r>
+              <a:rPr lang="en-CA" dirty="0" smtClean="0"/>
+              <a:t>LocalDev\2016-06\GitMe\2016-June-SQL\Supporting </a:t>
+            </a:r>
+            <a:r>
+              <a:rPr lang="en-CA" dirty="0" smtClean="0"/>
+              <a:t>Scripts\52 - SQL Functions are </a:t>
             </a:r>
             <a:r>
               <a:rPr lang="en-CA" dirty="0" err="1" smtClean="0"/>
@@ -1618,7 +1682,15 @@
           <a:p>
             <a:r>
               <a:rPr lang="en-CA" dirty="0" smtClean="0"/>
-              <a:t>C:\LocalDev\2016-06\GitMe\2016-June-AppPractice\Supporting Scripts\60 - Check your errors in </a:t>
+              <a:t>C:\</a:t>
+            </a:r>
+            <a:r>
+              <a:rPr lang="en-CA" dirty="0" smtClean="0"/>
+              <a:t>LocalDev\2016-06\GitMe\2016-June-SQL\Supporting </a:t>
+            </a:r>
+            <a:r>
+              <a:rPr lang="en-CA" dirty="0" smtClean="0"/>
+              <a:t>Scripts\60 - Check your errors in </a:t>
             </a:r>
             <a:r>
               <a:rPr lang="en-CA" dirty="0" err="1" smtClean="0"/>
@@ -1638,7 +1710,15 @@
           <a:p>
             <a:r>
               <a:rPr lang="en-CA" dirty="0" smtClean="0"/>
-              <a:t>C:\LocalDev\2016-06\GitMe\2016-June-AppPractice\Supporting Scripts\70 - RAISERROR instead of PRINT </a:t>
+              <a:t>C:\</a:t>
+            </a:r>
+            <a:r>
+              <a:rPr lang="en-CA" dirty="0" smtClean="0"/>
+              <a:t>LocalDev\2016-06\GitMe\2016-June-SQL\Supporting </a:t>
+            </a:r>
+            <a:r>
+              <a:rPr lang="en-CA" dirty="0" smtClean="0"/>
+              <a:t>Scripts\70 - RAISERROR instead of PRINT </a:t>
             </a:r>
             <a:r>
               <a:rPr lang="en-CA" dirty="0" err="1" smtClean="0"/>
@@ -1658,7 +1738,15 @@
           <a:p>
             <a:r>
               <a:rPr lang="en-CA" dirty="0" smtClean="0"/>
-              <a:t>C:\LocalDev\2016-06\GitMe\2016-June-AppPractice\Supporting Scripts\90 - Searching </a:t>
+              <a:t>C:\</a:t>
+            </a:r>
+            <a:r>
+              <a:rPr lang="en-CA" dirty="0" smtClean="0"/>
+              <a:t>LocalDev\2016-06\GitMe\2016-June-SQL\Supporting </a:t>
+            </a:r>
+            <a:r>
+              <a:rPr lang="en-CA" dirty="0" smtClean="0"/>
+              <a:t>Scripts\90 - Searching </a:t>
             </a:r>
             <a:r>
               <a:rPr lang="en-CA" dirty="0" err="1" smtClean="0"/>
@@ -1776,7 +1864,15 @@
             </a:pPr>
             <a:r>
               <a:rPr lang="en-CA" dirty="0" smtClean="0"/>
-              <a:t>C:\LocalDev\2016-06\GitMe\2016-June-AppPractice\Supporting Scripts\91 - Insert using commas for </a:t>
+              <a:t>C:\</a:t>
+            </a:r>
+            <a:r>
+              <a:rPr lang="en-CA" dirty="0" smtClean="0"/>
+              <a:t>LocalDev\2016-06\GitMe\2016-June-SQL\Supporting </a:t>
+            </a:r>
+            <a:r>
+              <a:rPr lang="en-CA" dirty="0" smtClean="0"/>
+              <a:t>Scripts\91 - Insert using commas for </a:t>
             </a:r>
             <a:r>
               <a:rPr lang="en-CA" dirty="0" err="1" smtClean="0"/>
@@ -1787,7 +1883,15 @@
           <a:p>
             <a:r>
               <a:rPr lang="en-CA" dirty="0" smtClean="0"/>
-              <a:t>C:\LocalDev\2016-06\GitMe\2016-June-AppPractice\Supporting Scripts\91 - Magic computed </a:t>
+              <a:t>C:\</a:t>
+            </a:r>
+            <a:r>
+              <a:rPr lang="en-CA" dirty="0" smtClean="0"/>
+              <a:t>LocalDev\2016-06\GitMe\2016-June-SQL\Supporting </a:t>
+            </a:r>
+            <a:r>
+              <a:rPr lang="en-CA" dirty="0" smtClean="0"/>
+              <a:t>Scripts\91 - Magic computed </a:t>
             </a:r>
             <a:r>
               <a:rPr lang="en-CA" dirty="0" err="1" smtClean="0"/>
@@ -1798,7 +1902,15 @@
           <a:p>
             <a:r>
               <a:rPr lang="en-CA" dirty="0" smtClean="0"/>
-              <a:t>C:\LocalDev\2016-06\GitMe\2016-June-AppPractice\Supporting Scripts\91 - Pagination and describe first </a:t>
+              <a:t>C:\</a:t>
+            </a:r>
+            <a:r>
+              <a:rPr lang="en-CA" dirty="0" smtClean="0"/>
+              <a:t>LocalDev\2016-06\GitMe\2016-June-SQL\Supporting </a:t>
+            </a:r>
+            <a:r>
+              <a:rPr lang="en-CA" dirty="0" smtClean="0"/>
+              <a:t>Scripts\91 - Pagination and describe first </a:t>
             </a:r>
             <a:r>
               <a:rPr lang="en-CA" dirty="0" err="1" smtClean="0"/>
@@ -1809,7 +1921,15 @@
           <a:p>
             <a:r>
               <a:rPr lang="en-CA" dirty="0" smtClean="0"/>
-              <a:t>C:\LocalDev\2016-06\GitMe\2016-June-AppPractice\Supporting Scripts\91 - Showing OUTPUT </a:t>
+              <a:t>C:\</a:t>
+            </a:r>
+            <a:r>
+              <a:rPr lang="en-CA" dirty="0" smtClean="0"/>
+              <a:t>LocalDev\2016-06\GitMe\2016-June-SQL\Supporting </a:t>
+            </a:r>
+            <a:r>
+              <a:rPr lang="en-CA" dirty="0" smtClean="0"/>
+              <a:t>Scripts\91 - Showing OUTPUT </a:t>
             </a:r>
             <a:r>
               <a:rPr lang="en-CA" dirty="0" err="1" smtClean="0"/>
@@ -2135,7 +2255,31 @@
                 <a:ea typeface="+mn-ea"/>
                 <a:cs typeface="+mn-cs"/>
               </a:rPr>
-              <a:t>C:\LocalDev\2016-06\GitMe\2016-June-AppPractice\Supporting Scripts\95 - Setting optimize for ad hoc workloads to </a:t>
+              <a:t>C:\</a:t>
+            </a:r>
+            <a:r>
+              <a:rPr lang="en-CA" sz="1200" b="0" i="0" kern="1200" dirty="0" smtClean="0">
+                <a:solidFill>
+                  <a:schemeClr val="tx1"/>
+                </a:solidFill>
+                <a:effectLst/>
+                <a:latin typeface="+mn-lt"/>
+                <a:ea typeface="+mn-ea"/>
+                <a:cs typeface="+mn-cs"/>
+              </a:rPr>
+              <a:t>LocalDev\2016-06\GitMe\2016-June-SQL\Supporting </a:t>
+            </a:r>
+            <a:r>
+              <a:rPr lang="en-CA" sz="1200" b="0" i="0" kern="1200" dirty="0" smtClean="0">
+                <a:solidFill>
+                  <a:schemeClr val="tx1"/>
+                </a:solidFill>
+                <a:effectLst/>
+                <a:latin typeface="+mn-lt"/>
+                <a:ea typeface="+mn-ea"/>
+                <a:cs typeface="+mn-cs"/>
+              </a:rPr>
+              <a:t>Scripts\95 - Setting optimize for ad hoc workloads to </a:t>
             </a:r>
             <a:r>
               <a:rPr lang="en-CA" sz="1200" b="0" i="0" kern="1200" dirty="0" err="1" smtClean="0">
@@ -2199,7 +2343,31 @@
                 <a:ea typeface="+mn-ea"/>
                 <a:cs typeface="+mn-cs"/>
               </a:rPr>
-              <a:t>C:\LocalDev\2016-06\GitMe\2016-June-AppPractice\Supporting Scripts\95</a:t>
+              <a:t>C:\</a:t>
+            </a:r>
+            <a:r>
+              <a:rPr lang="en-CA" sz="1200" b="0" i="0" kern="1200" dirty="0" smtClean="0">
+                <a:solidFill>
+                  <a:schemeClr val="tx1"/>
+                </a:solidFill>
+                <a:effectLst/>
+                <a:latin typeface="+mn-lt"/>
+                <a:ea typeface="+mn-ea"/>
+                <a:cs typeface="+mn-cs"/>
+              </a:rPr>
+              <a:t>LocalDev\2016-06\GitMe\2016-June-SQL\Supporting </a:t>
+            </a:r>
+            <a:r>
+              <a:rPr lang="en-CA" sz="1200" b="0" i="0" kern="1200" dirty="0" smtClean="0">
+                <a:solidFill>
+                  <a:schemeClr val="tx1"/>
+                </a:solidFill>
+                <a:effectLst/>
+                <a:latin typeface="+mn-lt"/>
+                <a:ea typeface="+mn-ea"/>
+                <a:cs typeface="+mn-cs"/>
+              </a:rPr>
+              <a:t>Scripts\95</a:t>
             </a:r>
             <a:r>
               <a:rPr lang="en-CA" sz="1200" b="0" i="0" kern="1200" baseline="0" dirty="0" smtClean="0">
@@ -3018,7 +3186,15 @@
           <a:p>
             <a:r>
               <a:rPr lang="en-CA" dirty="0" smtClean="0"/>
-              <a:t>C:\LocalDev\2016-06\GitMe\2016-June-AppPractice\Supporting Scripts\00 - Query to run across all registered </a:t>
+              <a:t>C:\</a:t>
+            </a:r>
+            <a:r>
+              <a:rPr lang="en-CA" dirty="0" smtClean="0"/>
+              <a:t>LocalDev\2016-06\GitMe\2016-June-SQL\Supporting </a:t>
+            </a:r>
+            <a:r>
+              <a:rPr lang="en-CA" dirty="0" smtClean="0"/>
+              <a:t>Scripts\00 - Query to run across all registered </a:t>
             </a:r>
             <a:r>
               <a:rPr lang="en-CA" dirty="0" err="1" smtClean="0"/>
@@ -3211,7 +3387,15 @@
           <a:p>
             <a:r>
               <a:rPr lang="en-CA" u="none" dirty="0" smtClean="0"/>
-              <a:t>C:\LocalDev\2016-06\GitMe\2016-June-AppPractice\Supporting Scripts\05 - querying for tables and </a:t>
+              <a:t>C:\</a:t>
+            </a:r>
+            <a:r>
+              <a:rPr lang="en-CA" u="none" dirty="0" smtClean="0"/>
+              <a:t>LocalDev\2016-06\GitMe\2016-June-SQL\Supporting </a:t>
+            </a:r>
+            <a:r>
+              <a:rPr lang="en-CA" u="none" dirty="0" smtClean="0"/>
+              <a:t>Scripts\05 - querying for tables and </a:t>
             </a:r>
             <a:r>
               <a:rPr lang="en-CA" u="none" dirty="0" err="1" smtClean="0"/>
@@ -6868,11 +7052,7 @@
           <a:p>
             <a:r>
               <a:rPr lang="en-CA" dirty="0" smtClean="0"/>
-              <a:t>Performance – </a:t>
-            </a:r>
-            <a:r>
-              <a:rPr lang="en-CA" dirty="0" smtClean="0"/>
-              <a:t>Return only data you need</a:t>
+              <a:t>Performance – Return only data you need</a:t>
             </a:r>
             <a:endParaRPr lang="en-CA" dirty="0"/>
           </a:p>
@@ -6899,7 +7079,6 @@
               <a:rPr lang="en-CA" dirty="0" smtClean="0"/>
               <a:t>Index Seek… great… but what about “Key Lookup” cost?</a:t>
             </a:r>
-            <a:endParaRPr lang="en-CA" dirty="0" smtClean="0"/>
           </a:p>
           <a:p>
             <a:endParaRPr lang="en-CA" dirty="0" smtClean="0"/>

</xml_diff>